<commit_message>
Overview and advantages points icluded
</commit_message>
<xml_diff>
--- a/Notes/Batch Scheduling.pptx
+++ b/Notes/Batch Scheduling.pptx
@@ -5,17 +5,18 @@
     <p:sldMasterId id="2147483658" r:id="rId4"/>
   </p:sldMasterIdLst>
   <p:notesMasterIdLst>
-    <p:notesMasterId r:id="rId10"/>
+    <p:notesMasterId r:id="rId11"/>
   </p:notesMasterIdLst>
   <p:handoutMasterIdLst>
-    <p:handoutMasterId r:id="rId11"/>
+    <p:handoutMasterId r:id="rId12"/>
   </p:handoutMasterIdLst>
   <p:sldIdLst>
     <p:sldId id="256" r:id="rId5"/>
     <p:sldId id="257" r:id="rId6"/>
-    <p:sldId id="258" r:id="rId7"/>
-    <p:sldId id="259" r:id="rId8"/>
-    <p:sldId id="260" r:id="rId9"/>
+    <p:sldId id="261" r:id="rId7"/>
+    <p:sldId id="258" r:id="rId8"/>
+    <p:sldId id="259" r:id="rId9"/>
+    <p:sldId id="260" r:id="rId10"/>
   </p:sldIdLst>
   <p:sldSz cx="12192000" cy="6858000"/>
   <p:notesSz cx="6858000" cy="9144000"/>
@@ -219,7 +220,7 @@
           <a:p>
             <a:fld id="{1FB51ED0-8724-4321-9903-1B6C4397769A}" type="datetimeFigureOut">
               <a:rPr lang="en-US" smtClean="0"/>
-              <a:t>7/9/2025</a:t>
+              <a:t>7/10/2025</a:t>
             </a:fld>
             <a:endParaRPr lang="en-US" dirty="0"/>
           </a:p>
@@ -396,7 +397,7 @@
           <a:p>
             <a:fld id="{E714778D-F34E-4BE4-9B6B-598D2E739C81}" type="datetimeFigureOut">
               <a:rPr lang="en-US" smtClean="0"/>
-              <a:t>7/9/2025</a:t>
+              <a:t>7/10/2025</a:t>
             </a:fld>
             <a:endParaRPr lang="en-US" dirty="0"/>
           </a:p>
@@ -9454,7 +9455,7 @@
           <a:p>
             <a:fld id="{0616FFC6-B6FD-417B-BDE1-C6395267D6DB}" type="datetimeFigureOut">
               <a:rPr lang="en-US" smtClean="0"/>
-              <a:t>7/9/2025</a:t>
+              <a:t>7/10/2025</a:t>
             </a:fld>
             <a:endParaRPr lang="en-US" dirty="0"/>
           </a:p>
@@ -10265,6 +10266,201 @@
         <p:cNvPr id="1" name="">
           <a:extLst>
             <a:ext uri="{FF2B5EF4-FFF2-40B4-BE49-F238E27FC236}">
+              <a16:creationId xmlns:a16="http://schemas.microsoft.com/office/drawing/2014/main" id="{E5D8A3B1-65EA-75E7-57A7-F250B76D5DDF}"/>
+            </a:ext>
+          </a:extLst>
+        </p:cNvPr>
+        <p:cNvGrpSpPr/>
+        <p:nvPr/>
+      </p:nvGrpSpPr>
+      <p:grpSpPr>
+        <a:xfrm>
+          <a:off x="0" y="0"/>
+          <a:ext cx="0" cy="0"/>
+          <a:chOff x="0" y="0"/>
+          <a:chExt cx="0" cy="0"/>
+        </a:xfrm>
+      </p:grpSpPr>
+      <p:sp>
+        <p:nvSpPr>
+          <p:cNvPr id="3" name="Subtitle 2">
+            <a:extLst>
+              <a:ext uri="{FF2B5EF4-FFF2-40B4-BE49-F238E27FC236}">
+                <a16:creationId xmlns:a16="http://schemas.microsoft.com/office/drawing/2014/main" id="{7E489CD4-8ADB-1FBA-CAEC-85C267E6F180}"/>
+              </a:ext>
+            </a:extLst>
+          </p:cNvPr>
+          <p:cNvSpPr>
+            <a:spLocks noGrp="1"/>
+          </p:cNvSpPr>
+          <p:nvPr>
+            <p:ph type="subTitle" idx="1"/>
+          </p:nvPr>
+        </p:nvSpPr>
+        <p:spPr>
+          <a:xfrm>
+            <a:off x="1629101" y="4682062"/>
+            <a:ext cx="8936846" cy="457201"/>
+          </a:xfrm>
+        </p:spPr>
+        <p:txBody>
+          <a:bodyPr/>
+          <a:lstStyle/>
+          <a:p>
+            <a:endParaRPr lang="en-US" dirty="0"/>
+          </a:p>
+          <a:p>
+            <a:endParaRPr lang="en-US" dirty="0"/>
+          </a:p>
+        </p:txBody>
+      </p:sp>
+      <p:sp>
+        <p:nvSpPr>
+          <p:cNvPr id="4" name="TextBox 3">
+            <a:extLst>
+              <a:ext uri="{FF2B5EF4-FFF2-40B4-BE49-F238E27FC236}">
+                <a16:creationId xmlns:a16="http://schemas.microsoft.com/office/drawing/2014/main" id="{FFD23588-F6ED-EAC5-533A-7195773AFC8C}"/>
+              </a:ext>
+            </a:extLst>
+          </p:cNvPr>
+          <p:cNvSpPr txBox="1"/>
+          <p:nvPr/>
+        </p:nvSpPr>
+        <p:spPr>
+          <a:xfrm>
+            <a:off x="1615033" y="2161870"/>
+            <a:ext cx="8936846" cy="461665"/>
+          </a:xfrm>
+          <a:prstGeom prst="rect">
+            <a:avLst/>
+          </a:prstGeom>
+          <a:noFill/>
+        </p:spPr>
+        <p:txBody>
+          <a:bodyPr wrap="square" rtlCol="0">
+            <a:spAutoFit/>
+          </a:bodyPr>
+          <a:lstStyle/>
+          <a:p>
+            <a:r>
+              <a:rPr lang="en-IN" sz="2400" b="1" dirty="0"/>
+              <a:t>							What is “Batch”?</a:t>
+            </a:r>
+          </a:p>
+        </p:txBody>
+      </p:sp>
+      <p:sp>
+        <p:nvSpPr>
+          <p:cNvPr id="5" name="TextBox 4">
+            <a:extLst>
+              <a:ext uri="{FF2B5EF4-FFF2-40B4-BE49-F238E27FC236}">
+                <a16:creationId xmlns:a16="http://schemas.microsoft.com/office/drawing/2014/main" id="{FC2846F5-B15D-F225-0BAB-8158D6E16D5B}"/>
+              </a:ext>
+            </a:extLst>
+          </p:cNvPr>
+          <p:cNvSpPr txBox="1"/>
+          <p:nvPr/>
+        </p:nvSpPr>
+        <p:spPr>
+          <a:xfrm>
+            <a:off x="1719306" y="2623535"/>
+            <a:ext cx="8832573" cy="2831544"/>
+          </a:xfrm>
+          <a:prstGeom prst="rect">
+            <a:avLst/>
+          </a:prstGeom>
+          <a:noFill/>
+        </p:spPr>
+        <p:txBody>
+          <a:bodyPr wrap="square" rtlCol="0">
+            <a:spAutoFit/>
+          </a:bodyPr>
+          <a:lstStyle/>
+          <a:p>
+            <a:r>
+              <a:rPr lang="en-US" sz="2000" dirty="0"/>
+              <a:t>A batch is a group of commands, scripts, or programs that are executed sequentially. In databases and operating systems, these often include:</a:t>
+            </a:r>
+          </a:p>
+          <a:p>
+            <a:endParaRPr lang="en-US" sz="2000" dirty="0"/>
+          </a:p>
+          <a:p>
+            <a:pPr marL="285750" indent="-285750">
+              <a:buFont typeface="Arial" panose="020B0604020202020204" pitchFamily="34" charset="0"/>
+              <a:buChar char="•"/>
+            </a:pPr>
+            <a:r>
+              <a:rPr lang="en-US" sz="2000" dirty="0"/>
+              <a:t>SQL scripts or stored procedures</a:t>
+            </a:r>
+          </a:p>
+          <a:p>
+            <a:pPr marL="285750" indent="-285750">
+              <a:buFont typeface="Arial" panose="020B0604020202020204" pitchFamily="34" charset="0"/>
+              <a:buChar char="•"/>
+            </a:pPr>
+            <a:r>
+              <a:rPr lang="en-US" sz="2000" dirty="0"/>
+              <a:t>File transfers (FTP, SFTP)</a:t>
+            </a:r>
+          </a:p>
+          <a:p>
+            <a:pPr marL="285750" indent="-285750">
+              <a:buFont typeface="Arial" panose="020B0604020202020204" pitchFamily="34" charset="0"/>
+              <a:buChar char="•"/>
+            </a:pPr>
+            <a:r>
+              <a:rPr lang="en-US" sz="2000" dirty="0"/>
+              <a:t>Data imports/exports</a:t>
+            </a:r>
+          </a:p>
+          <a:p>
+            <a:pPr marL="285750" indent="-285750">
+              <a:buFont typeface="Arial" panose="020B0604020202020204" pitchFamily="34" charset="0"/>
+              <a:buChar char="•"/>
+            </a:pPr>
+            <a:r>
+              <a:rPr lang="en-US" sz="2000" dirty="0"/>
+              <a:t>System backups or cleanups</a:t>
+            </a:r>
+          </a:p>
+          <a:p>
+            <a:pPr marL="285750" indent="-285750">
+              <a:buFont typeface="Arial" panose="020B0604020202020204" pitchFamily="34" charset="0"/>
+              <a:buChar char="•"/>
+            </a:pPr>
+            <a:r>
+              <a:rPr lang="en-US" sz="2000" dirty="0"/>
+              <a:t>Report generation tasks</a:t>
+            </a:r>
+          </a:p>
+          <a:p>
+            <a:endParaRPr lang="en-IN" dirty="0"/>
+          </a:p>
+        </p:txBody>
+      </p:sp>
+    </p:spTree>
+    <p:extLst>
+      <p:ext uri="{BB962C8B-B14F-4D97-AF65-F5344CB8AC3E}">
+        <p14:creationId xmlns:p14="http://schemas.microsoft.com/office/powerpoint/2010/main" val="79280"/>
+      </p:ext>
+    </p:extLst>
+  </p:cSld>
+  <p:clrMapOvr>
+    <a:masterClrMapping/>
+  </p:clrMapOvr>
+</p:sld>
+</file>
+
+<file path=ppt/slides/slide4.xml><?xml version="1.0" encoding="utf-8"?>
+<p:sld xmlns:a="http://schemas.openxmlformats.org/drawingml/2006/main" xmlns:r="http://schemas.openxmlformats.org/officeDocument/2006/relationships" xmlns:p="http://schemas.openxmlformats.org/presentationml/2006/main">
+  <p:cSld>
+    <p:spTree>
+      <p:nvGrpSpPr>
+        <p:cNvPr id="1" name="">
+          <a:extLst>
+            <a:ext uri="{FF2B5EF4-FFF2-40B4-BE49-F238E27FC236}">
               <a16:creationId xmlns:a16="http://schemas.microsoft.com/office/drawing/2014/main" id="{F2C51E6B-A714-5FA0-E03A-41F5C27DE2FD}"/>
             </a:ext>
           </a:extLst>
@@ -10564,7 +10760,7 @@
 </p:sld>
 </file>
 
-<file path=ppt/slides/slide4.xml><?xml version="1.0" encoding="utf-8"?>
+<file path=ppt/slides/slide5.xml><?xml version="1.0" encoding="utf-8"?>
 <p:sld xmlns:a="http://schemas.openxmlformats.org/drawingml/2006/main" xmlns:r="http://schemas.openxmlformats.org/officeDocument/2006/relationships" xmlns:p="http://schemas.openxmlformats.org/presentationml/2006/main">
   <p:cSld>
     <p:spTree>
@@ -10589,72 +10785,209 @@
       </p:grpSpPr>
       <p:sp>
         <p:nvSpPr>
-          <p:cNvPr id="2" name="Title 1">
+          <p:cNvPr id="9" name="TextBox 8">
             <a:extLst>
               <a:ext uri="{FF2B5EF4-FFF2-40B4-BE49-F238E27FC236}">
-                <a16:creationId xmlns:a16="http://schemas.microsoft.com/office/drawing/2014/main" id="{69F5D1F6-B96D-BE6B-2F92-750A2B6170C3}"/>
+                <a16:creationId xmlns:a16="http://schemas.microsoft.com/office/drawing/2014/main" id="{26C92B18-D3CB-2C2B-8B43-8BDDAABAD79B}"/>
               </a:ext>
             </a:extLst>
           </p:cNvPr>
-          <p:cNvSpPr>
-            <a:spLocks noGrp="1"/>
-          </p:cNvSpPr>
-          <p:nvPr>
-            <p:ph type="ctrTitle"/>
-          </p:nvPr>
-        </p:nvSpPr>
-        <p:spPr>
-          <a:xfrm>
-            <a:off x="1629103" y="2244830"/>
-            <a:ext cx="8933796" cy="2437232"/>
-          </a:xfrm>
-        </p:spPr>
-        <p:txBody>
-          <a:bodyPr>
-            <a:normAutofit/>
+          <p:cNvSpPr txBox="1"/>
+          <p:nvPr/>
+        </p:nvSpPr>
+        <p:spPr>
+          <a:xfrm>
+            <a:off x="1543929" y="1665235"/>
+            <a:ext cx="6098344" cy="369332"/>
+          </a:xfrm>
+          <a:prstGeom prst="rect">
+            <a:avLst/>
+          </a:prstGeom>
+          <a:noFill/>
+        </p:spPr>
+        <p:txBody>
+          <a:bodyPr wrap="square">
+            <a:spAutoFit/>
           </a:bodyPr>
           <a:lstStyle/>
           <a:p>
-            <a:r>
-              <a:rPr lang="en-US" dirty="0"/>
-              <a:t>Presentation title</a:t>
-            </a:r>
-          </a:p>
-        </p:txBody>
-      </p:sp>
-      <p:sp>
-        <p:nvSpPr>
-          <p:cNvPr id="3" name="Subtitle 2">
+            <a:pPr>
+              <a:buNone/>
+            </a:pPr>
+            <a:r>
+              <a:rPr lang="en-US" b="1" dirty="0"/>
+              <a:t>Key Features of Batch Scheduling :</a:t>
+            </a:r>
+          </a:p>
+        </p:txBody>
+      </p:sp>
+      <p:graphicFrame>
+        <p:nvGraphicFramePr>
+          <p:cNvPr id="12" name="Table 11">
             <a:extLst>
               <a:ext uri="{FF2B5EF4-FFF2-40B4-BE49-F238E27FC236}">
-                <a16:creationId xmlns:a16="http://schemas.microsoft.com/office/drawing/2014/main" id="{E6C16EDC-F8BD-C6D1-468F-B2B520BA3207}"/>
+                <a16:creationId xmlns:a16="http://schemas.microsoft.com/office/drawing/2014/main" id="{DAE1B575-F4EC-256D-F239-69B0704A9D05}"/>
               </a:ext>
             </a:extLst>
           </p:cNvPr>
-          <p:cNvSpPr>
-            <a:spLocks noGrp="1"/>
-          </p:cNvSpPr>
+          <p:cNvGraphicFramePr>
+            <a:graphicFrameLocks noGrp="1"/>
+          </p:cNvGraphicFramePr>
           <p:nvPr>
-            <p:ph type="subTitle" idx="1"/>
+            <p:extLst>
+              <p:ext uri="{D42A27DB-BD31-4B8C-83A1-F6EECF244321}">
+                <p14:modId xmlns:p14="http://schemas.microsoft.com/office/powerpoint/2010/main" val="919444177"/>
+              </p:ext>
+            </p:extLst>
           </p:nvPr>
-        </p:nvSpPr>
-        <p:spPr>
-          <a:xfrm>
-            <a:off x="1629101" y="4682062"/>
-            <a:ext cx="8936846" cy="457201"/>
-          </a:xfrm>
-        </p:spPr>
-        <p:txBody>
-          <a:bodyPr/>
-          <a:lstStyle/>
-          <a:p>
-            <a:r>
-              <a:rPr lang="en-US" dirty="0"/>
-              <a:t>Presenter name</a:t>
-            </a:r>
-          </a:p>
-        </p:txBody>
-      </p:sp>
+        </p:nvGraphicFramePr>
+        <p:xfrm>
+          <a:off x="1543928" y="2178598"/>
+          <a:ext cx="9063111" cy="3139440"/>
+        </p:xfrm>
+        <a:graphic>
+          <a:graphicData uri="http://schemas.openxmlformats.org/drawingml/2006/table">
+            <a:tbl>
+              <a:tblPr/>
+              <a:tblGrid>
+                <a:gridCol w="9063111">
+                  <a:extLst>
+                    <a:ext uri="{9D8B030D-6E8A-4147-A177-3AD203B41FA5}">
+                      <a16:colId xmlns:a16="http://schemas.microsoft.com/office/drawing/2014/main" val="2515416139"/>
+                    </a:ext>
+                  </a:extLst>
+                </a:gridCol>
+              </a:tblGrid>
+              <a:tr h="0">
+                <a:tc>
+                  <a:txBody>
+                    <a:bodyPr/>
+                    <a:lstStyle/>
+                    <a:p>
+                      <a:pPr marL="342900" indent="-342900">
+                        <a:buFont typeface="Arial" panose="020B0604020202020204" pitchFamily="34" charset="0"/>
+                        <a:buChar char="•"/>
+                      </a:pPr>
+                      <a:r>
+                        <a:rPr lang="en-US" sz="2000" b="1" dirty="0"/>
+                        <a:t>Automation</a:t>
+                      </a:r>
+                      <a:r>
+                        <a:rPr lang="en-US" sz="2000" dirty="0"/>
+                        <a:t> : Tasks run automatically on schedule</a:t>
+                      </a:r>
+                    </a:p>
+                    <a:p>
+                      <a:pPr marL="342900" indent="-342900">
+                        <a:buFont typeface="Arial" panose="020B0604020202020204" pitchFamily="34" charset="0"/>
+                        <a:buChar char="•"/>
+                      </a:pPr>
+                      <a:endParaRPr lang="en-US" sz="2000" dirty="0"/>
+                    </a:p>
+                    <a:p>
+                      <a:pPr marL="342900" indent="-342900">
+                        <a:buFont typeface="Arial" panose="020B0604020202020204" pitchFamily="34" charset="0"/>
+                        <a:buChar char="•"/>
+                      </a:pPr>
+                      <a:r>
+                        <a:rPr lang="en-US" sz="2000" b="1" dirty="0"/>
+                        <a:t>Non-Interactive</a:t>
+                      </a:r>
+                      <a:r>
+                        <a:rPr lang="en-US" sz="2000" dirty="0"/>
+                        <a:t> : Requires no user input once set</a:t>
+                      </a:r>
+                    </a:p>
+                    <a:p>
+                      <a:pPr marL="342900" indent="-342900">
+                        <a:buFont typeface="Arial" panose="020B0604020202020204" pitchFamily="34" charset="0"/>
+                        <a:buChar char="•"/>
+                      </a:pPr>
+                      <a:endParaRPr lang="en-US" sz="2000" dirty="0"/>
+                    </a:p>
+                    <a:p>
+                      <a:pPr marL="342900" indent="-342900">
+                        <a:buFont typeface="Arial" panose="020B0604020202020204" pitchFamily="34" charset="0"/>
+                        <a:buChar char="•"/>
+                      </a:pPr>
+                      <a:r>
+                        <a:rPr lang="en-US" sz="2000" b="1" dirty="0"/>
+                        <a:t>Time or Event Triggered</a:t>
+                      </a:r>
+                      <a:r>
+                        <a:rPr lang="en-US" sz="2000" dirty="0"/>
+                        <a:t> : Jobs can run daily, weekly, or after a specific event</a:t>
+                      </a:r>
+                    </a:p>
+                    <a:p>
+                      <a:pPr marL="342900" indent="-342900">
+                        <a:buFont typeface="Arial" panose="020B0604020202020204" pitchFamily="34" charset="0"/>
+                        <a:buChar char="•"/>
+                      </a:pPr>
+                      <a:endParaRPr lang="en-US" sz="2000" dirty="0"/>
+                    </a:p>
+                    <a:p>
+                      <a:pPr marL="342900" indent="-342900">
+                        <a:buFont typeface="Arial" panose="020B0604020202020204" pitchFamily="34" charset="0"/>
+                        <a:buChar char="•"/>
+                      </a:pPr>
+                      <a:r>
+                        <a:rPr lang="en-US" sz="2000" b="1" dirty="0"/>
+                        <a:t>Repeatable &amp; Reliable</a:t>
+                      </a:r>
+                      <a:r>
+                        <a:rPr lang="en-US" sz="2000" dirty="0"/>
+                        <a:t> : Ensures consistency in critical tasks</a:t>
+                      </a:r>
+                    </a:p>
+                    <a:p>
+                      <a:pPr marL="342900" indent="-342900">
+                        <a:buFont typeface="Arial" panose="020B0604020202020204" pitchFamily="34" charset="0"/>
+                        <a:buChar char="•"/>
+                      </a:pPr>
+                      <a:endParaRPr lang="en-US" sz="2000" dirty="0"/>
+                    </a:p>
+                    <a:p>
+                      <a:pPr marL="342900" indent="-342900">
+                        <a:buFont typeface="Arial" panose="020B0604020202020204" pitchFamily="34" charset="0"/>
+                        <a:buChar char="•"/>
+                      </a:pPr>
+                      <a:r>
+                        <a:rPr lang="en-US" sz="2000" b="1" dirty="0"/>
+                        <a:t>Resource Optimization</a:t>
+                      </a:r>
+                      <a:r>
+                        <a:rPr lang="en-US" sz="2000" dirty="0"/>
+                        <a:t> :  Jobs often run during off-peak hours to minimize performance impact</a:t>
+                      </a:r>
+                    </a:p>
+                  </a:txBody>
+                  <a:tcPr anchor="ctr">
+                    <a:lnL>
+                      <a:noFill/>
+                    </a:lnL>
+                    <a:lnR>
+                      <a:noFill/>
+                    </a:lnR>
+                    <a:lnT>
+                      <a:noFill/>
+                    </a:lnT>
+                    <a:lnB>
+                      <a:noFill/>
+                    </a:lnB>
+                    <a:noFill/>
+                  </a:tcPr>
+                </a:tc>
+                <a:extLst>
+                  <a:ext uri="{0D108BD9-81ED-4DB2-BD59-A6C34878D82A}">
+                    <a16:rowId xmlns:a16="http://schemas.microsoft.com/office/drawing/2014/main" val="1000664695"/>
+                  </a:ext>
+                </a:extLst>
+              </a:tr>
+            </a:tbl>
+          </a:graphicData>
+        </a:graphic>
+      </p:graphicFrame>
     </p:spTree>
     <p:extLst>
       <p:ext uri="{BB962C8B-B14F-4D97-AF65-F5344CB8AC3E}">
@@ -10668,7 +11001,7 @@
 </p:sld>
 </file>
 
-<file path=ppt/slides/slide5.xml><?xml version="1.0" encoding="utf-8"?>
+<file path=ppt/slides/slide6.xml><?xml version="1.0" encoding="utf-8"?>
 <p:sld xmlns:a="http://schemas.openxmlformats.org/drawingml/2006/main" xmlns:r="http://schemas.openxmlformats.org/officeDocument/2006/relationships" xmlns:p="http://schemas.openxmlformats.org/presentationml/2006/main">
   <p:cSld>
     <p:spTree>
@@ -10693,68 +11026,94 @@
       </p:grpSpPr>
       <p:sp>
         <p:nvSpPr>
-          <p:cNvPr id="2" name="Title 1">
+          <p:cNvPr id="9" name="TextBox 8">
             <a:extLst>
               <a:ext uri="{FF2B5EF4-FFF2-40B4-BE49-F238E27FC236}">
-                <a16:creationId xmlns:a16="http://schemas.microsoft.com/office/drawing/2014/main" id="{BF58428B-6054-A9DD-6EF8-B33A652E1757}"/>
+                <a16:creationId xmlns:a16="http://schemas.microsoft.com/office/drawing/2014/main" id="{79087BD5-064C-86DA-4BC2-C713A0046091}"/>
               </a:ext>
             </a:extLst>
           </p:cNvPr>
-          <p:cNvSpPr>
-            <a:spLocks noGrp="1"/>
-          </p:cNvSpPr>
-          <p:nvPr>
-            <p:ph type="ctrTitle"/>
-          </p:nvPr>
-        </p:nvSpPr>
-        <p:spPr>
-          <a:xfrm>
-            <a:off x="1629103" y="2244830"/>
-            <a:ext cx="8933796" cy="2437232"/>
-          </a:xfrm>
-        </p:spPr>
-        <p:txBody>
-          <a:bodyPr>
-            <a:normAutofit/>
+          <p:cNvSpPr txBox="1"/>
+          <p:nvPr/>
+        </p:nvSpPr>
+        <p:spPr>
+          <a:xfrm>
+            <a:off x="1587305" y="2053882"/>
+            <a:ext cx="8595360" cy="3108543"/>
+          </a:xfrm>
+          <a:prstGeom prst="rect">
+            <a:avLst/>
+          </a:prstGeom>
+          <a:noFill/>
+        </p:spPr>
+        <p:txBody>
+          <a:bodyPr wrap="square">
+            <a:spAutoFit/>
           </a:bodyPr>
           <a:lstStyle/>
           <a:p>
-            <a:r>
-              <a:rPr lang="en-US" dirty="0"/>
-              <a:t>Presentation title</a:t>
-            </a:r>
-          </a:p>
-        </p:txBody>
-      </p:sp>
-      <p:sp>
-        <p:nvSpPr>
-          <p:cNvPr id="3" name="Subtitle 2">
-            <a:extLst>
-              <a:ext uri="{FF2B5EF4-FFF2-40B4-BE49-F238E27FC236}">
-                <a16:creationId xmlns:a16="http://schemas.microsoft.com/office/drawing/2014/main" id="{2596813B-6819-4805-2C12-1D2A389FEAEF}"/>
-              </a:ext>
-            </a:extLst>
-          </p:cNvPr>
-          <p:cNvSpPr>
-            <a:spLocks noGrp="1"/>
-          </p:cNvSpPr>
-          <p:nvPr>
-            <p:ph type="subTitle" idx="1"/>
-          </p:nvPr>
-        </p:nvSpPr>
-        <p:spPr>
-          <a:xfrm>
-            <a:off x="1629101" y="4682062"/>
-            <a:ext cx="8936846" cy="457201"/>
-          </a:xfrm>
-        </p:spPr>
-        <p:txBody>
-          <a:bodyPr/>
-          <a:lstStyle/>
-          <a:p>
-            <a:r>
-              <a:rPr lang="en-US" dirty="0"/>
-              <a:t>Presenter name</a:t>
+            <a:pPr>
+              <a:buNone/>
+            </a:pPr>
+            <a:r>
+              <a:rPr lang="en-US" sz="2800" b="1" dirty="0"/>
+              <a:t>Benefits of Batch Scheduling : </a:t>
+            </a:r>
+          </a:p>
+          <a:p>
+            <a:pPr>
+              <a:buNone/>
+            </a:pPr>
+            <a:endParaRPr lang="en-US" sz="2800" b="1" dirty="0"/>
+          </a:p>
+          <a:p>
+            <a:pPr marL="457200" indent="-457200">
+              <a:buFont typeface="Arial" panose="020B0604020202020204" pitchFamily="34" charset="0"/>
+              <a:buChar char="•"/>
+            </a:pPr>
+            <a:r>
+              <a:rPr lang="en-US" sz="2800" dirty="0"/>
+              <a:t>Saves time and reduces manual work</a:t>
+            </a:r>
+          </a:p>
+          <a:p>
+            <a:pPr marL="457200" indent="-457200">
+              <a:buFont typeface="Arial" panose="020B0604020202020204" pitchFamily="34" charset="0"/>
+              <a:buChar char="•"/>
+            </a:pPr>
+            <a:r>
+              <a:rPr lang="en-US" sz="2800" dirty="0"/>
+              <a:t>Increases reliability and operational consistency</a:t>
+            </a:r>
+          </a:p>
+          <a:p>
+            <a:pPr marL="457200" indent="-457200">
+              <a:buFont typeface="Arial" panose="020B0604020202020204" pitchFamily="34" charset="0"/>
+              <a:buChar char="•"/>
+            </a:pPr>
+            <a:r>
+              <a:rPr lang="en-US" sz="2800" dirty="0"/>
+              <a:t>Enables off-hours processing to improve performance</a:t>
+            </a:r>
+          </a:p>
+          <a:p>
+            <a:pPr marL="457200" indent="-457200">
+              <a:buFont typeface="Arial" panose="020B0604020202020204" pitchFamily="34" charset="0"/>
+              <a:buChar char="•"/>
+            </a:pPr>
+            <a:r>
+              <a:rPr lang="en-US" sz="2800" dirty="0"/>
+              <a:t>Reduces the chance of human error</a:t>
+            </a:r>
+          </a:p>
+          <a:p>
+            <a:pPr marL="457200" indent="-457200">
+              <a:buFont typeface="Arial" panose="020B0604020202020204" pitchFamily="34" charset="0"/>
+              <a:buChar char="•"/>
+            </a:pPr>
+            <a:r>
+              <a:rPr lang="en-US" sz="2800" dirty="0"/>
+              <a:t>Enhances scalability for growing systems</a:t>
             </a:r>
           </a:p>
         </p:txBody>
@@ -11639,34 +11998,6 @@
 </file>
 
 <file path=customXml/item1.xml><?xml version="1.0" encoding="utf-8"?>
-<p:properties xmlns:p="http://schemas.microsoft.com/office/2006/metadata/properties" xmlns:xsi="http://www.w3.org/2001/XMLSchema-instance" xmlns:pc="http://schemas.microsoft.com/office/infopath/2007/PartnerControls">
-  <documentManagement>
-    <Status xmlns="71af3243-3dd4-4a8d-8c0d-dd76da1f02a5">Not started</Status>
-    <_ip_UnifiedCompliancePolicyUIAction xmlns="http://schemas.microsoft.com/sharepoint/v3" xsi:nil="true"/>
-    <Image xmlns="71af3243-3dd4-4a8d-8c0d-dd76da1f02a5">
-      <Url xsi:nil="true"/>
-      <Description xsi:nil="true"/>
-    </Image>
-    <_ip_UnifiedCompliancePolicyProperties xmlns="http://schemas.microsoft.com/sharepoint/v3" xsi:nil="true"/>
-    <ImageTagsTaxHTField xmlns="71af3243-3dd4-4a8d-8c0d-dd76da1f02a5">
-      <Terms xmlns="http://schemas.microsoft.com/office/infopath/2007/PartnerControls"/>
-    </ImageTagsTaxHTField>
-    <TaxCatchAll xmlns="230e9df3-be65-4c73-a93b-d1236ebd677e"/>
-    <MediaServiceKeyPoints xmlns="71af3243-3dd4-4a8d-8c0d-dd76da1f02a5" xsi:nil="true"/>
-  </documentManagement>
-</p:properties>
-</file>
-
-<file path=customXml/item2.xml><?xml version="1.0" encoding="utf-8"?>
-<?mso-contentType ?>
-<FormTemplates xmlns="http://schemas.microsoft.com/sharepoint/v3/contenttype/forms">
-  <Display>DocumentLibraryForm</Display>
-  <Edit>DocumentLibraryForm</Edit>
-  <New>DocumentLibraryForm</New>
-</FormTemplates>
-</file>
-
-<file path=customXml/item3.xml><?xml version="1.0" encoding="utf-8"?>
 <ct:contentTypeSchema xmlns:ct="http://schemas.microsoft.com/office/2006/metadata/contentType" xmlns:ma="http://schemas.microsoft.com/office/2006/metadata/properties/metaAttributes" ct:_="" ma:_="" ma:contentTypeName="Document" ma:contentTypeID="0x01010079F111ED35F8CC479449609E8A0923A6" ma:contentTypeVersion="20" ma:contentTypeDescription="Create a new document." ma:contentTypeScope="" ma:versionID="1267097ee5f5874adfcc408041ae252e">
   <xsd:schema xmlns:xsd="http://www.w3.org/2001/XMLSchema" xmlns:xs="http://www.w3.org/2001/XMLSchema" xmlns:p="http://schemas.microsoft.com/office/2006/metadata/properties" xmlns:ns1="http://schemas.microsoft.com/sharepoint/v3" xmlns:ns2="71af3243-3dd4-4a8d-8c0d-dd76da1f02a5" xmlns:ns3="16c05727-aa75-4e4a-9b5f-8a80a1165891" xmlns:ns4="230e9df3-be65-4c73-a93b-d1236ebd677e" targetNamespace="http://schemas.microsoft.com/office/2006/metadata/properties" ma:root="true" ma:fieldsID="395891a93df65b14727750f2c06c306c" ns1:_="" ns2:_="" ns3:_="" ns4:_="">
     <xsd:import namespace="http://schemas.microsoft.com/sharepoint/v3"/>
@@ -11942,27 +12273,35 @@
 </ct:contentTypeSchema>
 </file>
 
-<file path=customXml/itemProps1.xml><?xml version="1.0" encoding="utf-8"?>
-<ds:datastoreItem xmlns:ds="http://schemas.openxmlformats.org/officeDocument/2006/customXml" ds:itemID="{EB3D0E2C-DCCF-4DCA-8700-60C67A2E1F44}">
-  <ds:schemaRefs>
-    <ds:schemaRef ds:uri="http://schemas.microsoft.com/office/2006/metadata/properties"/>
-    <ds:schemaRef ds:uri="http://schemas.microsoft.com/office/infopath/2007/PartnerControls"/>
-    <ds:schemaRef ds:uri="71af3243-3dd4-4a8d-8c0d-dd76da1f02a5"/>
-    <ds:schemaRef ds:uri="http://schemas.microsoft.com/sharepoint/v3"/>
-    <ds:schemaRef ds:uri="230e9df3-be65-4c73-a93b-d1236ebd677e"/>
-  </ds:schemaRefs>
-</ds:datastoreItem>
+<file path=customXml/item2.xml><?xml version="1.0" encoding="utf-8"?>
+<?mso-contentType ?>
+<FormTemplates xmlns="http://schemas.microsoft.com/sharepoint/v3/contenttype/forms">
+  <Display>DocumentLibraryForm</Display>
+  <Edit>DocumentLibraryForm</Edit>
+  <New>DocumentLibraryForm</New>
+</FormTemplates>
 </file>
 
-<file path=customXml/itemProps2.xml><?xml version="1.0" encoding="utf-8"?>
-<ds:datastoreItem xmlns:ds="http://schemas.openxmlformats.org/officeDocument/2006/customXml" ds:itemID="{B13FC90C-E938-4D14-B988-1AABB7F8F353}">
-  <ds:schemaRefs>
-    <ds:schemaRef ds:uri="http://schemas.microsoft.com/sharepoint/v3/contenttype/forms"/>
-  </ds:schemaRefs>
-</ds:datastoreItem>
+<file path=customXml/item3.xml><?xml version="1.0" encoding="utf-8"?>
+<p:properties xmlns:p="http://schemas.microsoft.com/office/2006/metadata/properties" xmlns:xsi="http://www.w3.org/2001/XMLSchema-instance" xmlns:pc="http://schemas.microsoft.com/office/infopath/2007/PartnerControls">
+  <documentManagement>
+    <Status xmlns="71af3243-3dd4-4a8d-8c0d-dd76da1f02a5">Not started</Status>
+    <_ip_UnifiedCompliancePolicyUIAction xmlns="http://schemas.microsoft.com/sharepoint/v3" xsi:nil="true"/>
+    <Image xmlns="71af3243-3dd4-4a8d-8c0d-dd76da1f02a5">
+      <Url xsi:nil="true"/>
+      <Description xsi:nil="true"/>
+    </Image>
+    <_ip_UnifiedCompliancePolicyProperties xmlns="http://schemas.microsoft.com/sharepoint/v3" xsi:nil="true"/>
+    <ImageTagsTaxHTField xmlns="71af3243-3dd4-4a8d-8c0d-dd76da1f02a5">
+      <Terms xmlns="http://schemas.microsoft.com/office/infopath/2007/PartnerControls"/>
+    </ImageTagsTaxHTField>
+    <TaxCatchAll xmlns="230e9df3-be65-4c73-a93b-d1236ebd677e"/>
+    <MediaServiceKeyPoints xmlns="71af3243-3dd4-4a8d-8c0d-dd76da1f02a5" xsi:nil="true"/>
+  </documentManagement>
+</p:properties>
 </file>
 
-<file path=customXml/itemProps3.xml><?xml version="1.0" encoding="utf-8"?>
+<file path=customXml/itemProps1.xml><?xml version="1.0" encoding="utf-8"?>
 <ds:datastoreItem xmlns:ds="http://schemas.openxmlformats.org/officeDocument/2006/customXml" ds:itemID="{37802517-FD5A-4D6F-9BEF-6B50583B6DA4}">
   <ds:schemaRefs>
     <ds:schemaRef ds:uri="http://schemas.microsoft.com/office/2006/metadata/contentType"/>
@@ -11981,4 +12320,24 @@
     <ds:schemaRef ds:uri="http://schemas.microsoft.com/internal/obd"/>
   </ds:schemaRefs>
 </ds:datastoreItem>
+</file>
+
+<file path=customXml/itemProps2.xml><?xml version="1.0" encoding="utf-8"?>
+<ds:datastoreItem xmlns:ds="http://schemas.openxmlformats.org/officeDocument/2006/customXml" ds:itemID="{B13FC90C-E938-4D14-B988-1AABB7F8F353}">
+  <ds:schemaRefs>
+    <ds:schemaRef ds:uri="http://schemas.microsoft.com/sharepoint/v3/contenttype/forms"/>
+  </ds:schemaRefs>
+</ds:datastoreItem>
+</file>
+
+<file path=customXml/itemProps3.xml><?xml version="1.0" encoding="utf-8"?>
+<ds:datastoreItem xmlns:ds="http://schemas.openxmlformats.org/officeDocument/2006/customXml" ds:itemID="{EB3D0E2C-DCCF-4DCA-8700-60C67A2E1F44}">
+  <ds:schemaRefs>
+    <ds:schemaRef ds:uri="http://schemas.microsoft.com/office/2006/metadata/properties"/>
+    <ds:schemaRef ds:uri="http://schemas.microsoft.com/office/infopath/2007/PartnerControls"/>
+    <ds:schemaRef ds:uri="71af3243-3dd4-4a8d-8c0d-dd76da1f02a5"/>
+    <ds:schemaRef ds:uri="http://schemas.microsoft.com/sharepoint/v3"/>
+    <ds:schemaRef ds:uri="230e9df3-be65-4c73-a93b-d1236ebd677e"/>
+  </ds:schemaRefs>
+</ds:datastoreItem>
 </file>
</xml_diff>